<commit_message>
Correct as at 18/01/2015 Updated Slides: Scope Removed Slides: 1.Playable 2.Alpha 3.Beta 4.Final
</commit_message>
<xml_diff>
--- a/Other/Awesome Possum_PreProd Presentation.pptx
+++ b/Other/Awesome Possum_PreProd Presentation.pptx
@@ -8,14 +8,10 @@
     <p:sldId id="256" r:id="rId2"/>
     <p:sldId id="257" r:id="rId3"/>
     <p:sldId id="264" r:id="rId4"/>
-    <p:sldId id="265" r:id="rId5"/>
+    <p:sldId id="258" r:id="rId5"/>
     <p:sldId id="266" r:id="rId6"/>
-    <p:sldId id="263" r:id="rId7"/>
-    <p:sldId id="258" r:id="rId8"/>
-    <p:sldId id="259" r:id="rId9"/>
-    <p:sldId id="260" r:id="rId10"/>
-    <p:sldId id="261" r:id="rId11"/>
-    <p:sldId id="262" r:id="rId12"/>
+    <p:sldId id="265" r:id="rId7"/>
+    <p:sldId id="263" r:id="rId8"/>
   </p:sldIdLst>
   <p:sldSz cx="12192000" cy="6858000"/>
   <p:notesSz cx="6858000" cy="9144000"/>
@@ -114,6 +110,22 @@
       </a:defRPr>
     </a:lvl9pPr>
   </p:defaultTextStyle>
+  <p:extLst>
+    <p:ext uri="{EFAFB233-063F-42B5-8137-9DF3F51BA10A}">
+      <p15:sldGuideLst xmlns:p15="http://schemas.microsoft.com/office/powerpoint/2012/main">
+        <p15:guide id="1" orient="horz" pos="2160">
+          <p15:clr>
+            <a:srgbClr val="A4A3A4"/>
+          </p15:clr>
+        </p15:guide>
+        <p15:guide id="2" pos="3840">
+          <p15:clr>
+            <a:srgbClr val="A4A3A4"/>
+          </p15:clr>
+        </p15:guide>
+      </p15:sldGuideLst>
+    </p:ext>
+  </p:extLst>
 </p:presentation>
 </file>
 
@@ -448,7 +460,7 @@
           <a:p>
             <a:fld id="{F2F3E20E-6A9D-41D1-8029-6718368C5576}" type="datetimeFigureOut">
               <a:rPr lang="en-SG" smtClean="0"/>
-              <a:t>17/1/15</a:t>
+              <a:t>18/1/2015</a:t>
             </a:fld>
             <a:endParaRPr lang="en-SG"/>
           </a:p>
@@ -772,7 +784,7 @@
           <a:p>
             <a:fld id="{F2F3E20E-6A9D-41D1-8029-6718368C5576}" type="datetimeFigureOut">
               <a:rPr lang="en-SG" smtClean="0"/>
-              <a:t>17/1/15</a:t>
+              <a:t>18/1/2015</a:t>
             </a:fld>
             <a:endParaRPr lang="en-SG"/>
           </a:p>
@@ -1020,7 +1032,7 @@
           <a:p>
             <a:fld id="{F2F3E20E-6A9D-41D1-8029-6718368C5576}" type="datetimeFigureOut">
               <a:rPr lang="en-SG" smtClean="0"/>
-              <a:t>17/1/15</a:t>
+              <a:t>18/1/2015</a:t>
             </a:fld>
             <a:endParaRPr lang="en-SG"/>
           </a:p>
@@ -1359,7 +1371,7 @@
           <a:p>
             <a:fld id="{F2F3E20E-6A9D-41D1-8029-6718368C5576}" type="datetimeFigureOut">
               <a:rPr lang="en-SG" smtClean="0"/>
-              <a:t>17/1/15</a:t>
+              <a:t>18/1/2015</a:t>
             </a:fld>
             <a:endParaRPr lang="en-SG"/>
           </a:p>
@@ -1706,7 +1718,7 @@
           <a:p>
             <a:fld id="{F2F3E20E-6A9D-41D1-8029-6718368C5576}" type="datetimeFigureOut">
               <a:rPr lang="en-SG" smtClean="0"/>
-              <a:t>17/1/15</a:t>
+              <a:t>18/1/2015</a:t>
             </a:fld>
             <a:endParaRPr lang="en-SG"/>
           </a:p>
@@ -2080,7 +2092,7 @@
           <a:p>
             <a:fld id="{F2F3E20E-6A9D-41D1-8029-6718368C5576}" type="datetimeFigureOut">
               <a:rPr lang="en-SG" smtClean="0"/>
-              <a:t>17/1/15</a:t>
+              <a:t>18/1/2015</a:t>
             </a:fld>
             <a:endParaRPr lang="en-SG"/>
           </a:p>
@@ -2550,7 +2562,7 @@
           <a:p>
             <a:fld id="{F2F3E20E-6A9D-41D1-8029-6718368C5576}" type="datetimeFigureOut">
               <a:rPr lang="en-SG" smtClean="0"/>
-              <a:t>17/1/15</a:t>
+              <a:t>18/1/2015</a:t>
             </a:fld>
             <a:endParaRPr lang="en-SG"/>
           </a:p>
@@ -2755,7 +2767,7 @@
           <a:p>
             <a:fld id="{F2F3E20E-6A9D-41D1-8029-6718368C5576}" type="datetimeFigureOut">
               <a:rPr lang="en-SG" smtClean="0"/>
-              <a:t>17/1/15</a:t>
+              <a:t>18/1/2015</a:t>
             </a:fld>
             <a:endParaRPr lang="en-SG"/>
           </a:p>
@@ -2966,7 +2978,7 @@
           <a:p>
             <a:fld id="{F2F3E20E-6A9D-41D1-8029-6718368C5576}" type="datetimeFigureOut">
               <a:rPr lang="en-SG" smtClean="0"/>
-              <a:t>17/1/15</a:t>
+              <a:t>18/1/2015</a:t>
             </a:fld>
             <a:endParaRPr lang="en-SG"/>
           </a:p>
@@ -3198,7 +3210,7 @@
           <a:p>
             <a:fld id="{F2F3E20E-6A9D-41D1-8029-6718368C5576}" type="datetimeFigureOut">
               <a:rPr lang="en-SG" smtClean="0"/>
-              <a:t>17/1/15</a:t>
+              <a:t>18/1/2015</a:t>
             </a:fld>
             <a:endParaRPr lang="en-SG"/>
           </a:p>
@@ -3446,7 +3458,7 @@
           <a:p>
             <a:fld id="{F2F3E20E-6A9D-41D1-8029-6718368C5576}" type="datetimeFigureOut">
               <a:rPr lang="en-SG" smtClean="0"/>
-              <a:t>17/1/15</a:t>
+              <a:t>18/1/2015</a:t>
             </a:fld>
             <a:endParaRPr lang="en-SG"/>
           </a:p>
@@ -3744,7 +3756,7 @@
           <a:p>
             <a:fld id="{F2F3E20E-6A9D-41D1-8029-6718368C5576}" type="datetimeFigureOut">
               <a:rPr lang="en-SG" smtClean="0"/>
-              <a:t>17/1/15</a:t>
+              <a:t>18/1/2015</a:t>
             </a:fld>
             <a:endParaRPr lang="en-SG"/>
           </a:p>
@@ -4138,7 +4150,7 @@
           <a:p>
             <a:fld id="{F2F3E20E-6A9D-41D1-8029-6718368C5576}" type="datetimeFigureOut">
               <a:rPr lang="en-SG" smtClean="0"/>
-              <a:t>17/1/15</a:t>
+              <a:t>18/1/2015</a:t>
             </a:fld>
             <a:endParaRPr lang="en-SG"/>
           </a:p>
@@ -4287,7 +4299,7 @@
           <a:p>
             <a:fld id="{F2F3E20E-6A9D-41D1-8029-6718368C5576}" type="datetimeFigureOut">
               <a:rPr lang="en-SG" smtClean="0"/>
-              <a:t>17/1/15</a:t>
+              <a:t>18/1/2015</a:t>
             </a:fld>
             <a:endParaRPr lang="en-SG"/>
           </a:p>
@@ -4413,7 +4425,7 @@
           <a:p>
             <a:fld id="{F2F3E20E-6A9D-41D1-8029-6718368C5576}" type="datetimeFigureOut">
               <a:rPr lang="en-SG" smtClean="0"/>
-              <a:t>17/1/15</a:t>
+              <a:t>18/1/2015</a:t>
             </a:fld>
             <a:endParaRPr lang="en-SG"/>
           </a:p>
@@ -4668,7 +4680,7 @@
           <a:p>
             <a:fld id="{F2F3E20E-6A9D-41D1-8029-6718368C5576}" type="datetimeFigureOut">
               <a:rPr lang="en-SG" smtClean="0"/>
-              <a:t>17/1/15</a:t>
+              <a:t>18/1/2015</a:t>
             </a:fld>
             <a:endParaRPr lang="en-SG"/>
           </a:p>
@@ -4983,7 +4995,7 @@
           <a:p>
             <a:fld id="{F2F3E20E-6A9D-41D1-8029-6718368C5576}" type="datetimeFigureOut">
               <a:rPr lang="en-SG" smtClean="0"/>
-              <a:t>17/1/15</a:t>
+              <a:t>18/1/2015</a:t>
             </a:fld>
             <a:endParaRPr lang="en-SG"/>
           </a:p>
@@ -5334,7 +5346,7 @@
           <a:p>
             <a:fld id="{F2F3E20E-6A9D-41D1-8029-6718368C5576}" type="datetimeFigureOut">
               <a:rPr lang="en-SG" smtClean="0"/>
-              <a:t>17/1/15</a:t>
+              <a:t>18/1/2015</a:t>
             </a:fld>
             <a:endParaRPr lang="en-SG"/>
           </a:p>
@@ -5961,183 +5973,13 @@
   <p:clrMapOvr>
     <a:masterClrMapping/>
   </p:clrMapOvr>
-</p:sld>
-</file>
-
-<file path=ppt/slides/slide10.xml><?xml version="1.0" encoding="utf-8"?>
-<p:sld xmlns:a="http://schemas.openxmlformats.org/drawingml/2006/main" xmlns:r="http://schemas.openxmlformats.org/officeDocument/2006/relationships" xmlns:p="http://schemas.openxmlformats.org/presentationml/2006/main">
-  <p:cSld>
-    <p:spTree>
-      <p:nvGrpSpPr>
-        <p:cNvPr id="1" name=""/>
-        <p:cNvGrpSpPr/>
-        <p:nvPr/>
-      </p:nvGrpSpPr>
-      <p:grpSpPr>
-        <a:xfrm>
-          <a:off x="0" y="0"/>
-          <a:ext cx="0" cy="0"/>
-          <a:chOff x="0" y="0"/>
-          <a:chExt cx="0" cy="0"/>
-        </a:xfrm>
-      </p:grpSpPr>
-      <p:sp>
-        <p:nvSpPr>
-          <p:cNvPr id="2" name="Title 1"/>
-          <p:cNvSpPr>
-            <a:spLocks noGrp="1"/>
-          </p:cNvSpPr>
-          <p:nvPr>
-            <p:ph type="title"/>
-          </p:nvPr>
-        </p:nvSpPr>
-        <p:spPr/>
-        <p:txBody>
-          <a:bodyPr/>
-          <a:lstStyle/>
-          <a:p>
-            <a:r>
-              <a:rPr lang="en-SG" dirty="0" smtClean="0"/>
-              <a:t>Beta</a:t>
-            </a:r>
-            <a:endParaRPr lang="en-SG" dirty="0"/>
-          </a:p>
-        </p:txBody>
-      </p:sp>
-      <p:sp>
-        <p:nvSpPr>
-          <p:cNvPr id="3" name="Content Placeholder 2"/>
-          <p:cNvSpPr>
-            <a:spLocks noGrp="1"/>
-          </p:cNvSpPr>
-          <p:nvPr>
-            <p:ph idx="1"/>
-          </p:nvPr>
-        </p:nvSpPr>
-        <p:spPr/>
-        <p:txBody>
-          <a:bodyPr/>
-          <a:lstStyle/>
-          <a:p>
-            <a:r>
-              <a:rPr lang="en-SG" dirty="0" smtClean="0"/>
-              <a:t>Single Player Mode</a:t>
-            </a:r>
-          </a:p>
-          <a:p>
-            <a:pPr lvl="1"/>
-            <a:r>
-              <a:rPr lang="en-SG" dirty="0" smtClean="0"/>
-              <a:t>10 Tracks – Possible High-score Tracking</a:t>
-            </a:r>
-          </a:p>
-          <a:p>
-            <a:r>
-              <a:rPr lang="en-SG" dirty="0" smtClean="0"/>
-              <a:t>Multiplayer – Bomb Tag Complete</a:t>
-            </a:r>
-          </a:p>
-          <a:p>
-            <a:pPr lvl="1"/>
-            <a:r>
-              <a:rPr lang="en-SG" dirty="0" smtClean="0"/>
-              <a:t>3 Power-ups</a:t>
-            </a:r>
-          </a:p>
-          <a:p>
-            <a:r>
-              <a:rPr lang="en-SG" dirty="0" smtClean="0"/>
-              <a:t>Multiplayer – Outrun Complete</a:t>
-            </a:r>
-          </a:p>
-        </p:txBody>
-      </p:sp>
-    </p:spTree>
-    <p:extLst>
-      <p:ext uri="{BB962C8B-B14F-4D97-AF65-F5344CB8AC3E}">
-        <p14:creationId xmlns:p14="http://schemas.microsoft.com/office/powerpoint/2010/main" val="432764864"/>
-      </p:ext>
-    </p:extLst>
-  </p:cSld>
-  <p:clrMapOvr>
-    <a:masterClrMapping/>
-  </p:clrMapOvr>
-</p:sld>
-</file>
-
-<file path=ppt/slides/slide11.xml><?xml version="1.0" encoding="utf-8"?>
-<p:sld xmlns:a="http://schemas.openxmlformats.org/drawingml/2006/main" xmlns:r="http://schemas.openxmlformats.org/officeDocument/2006/relationships" xmlns:p="http://schemas.openxmlformats.org/presentationml/2006/main">
-  <p:cSld>
-    <p:spTree>
-      <p:nvGrpSpPr>
-        <p:cNvPr id="1" name=""/>
-        <p:cNvGrpSpPr/>
-        <p:nvPr/>
-      </p:nvGrpSpPr>
-      <p:grpSpPr>
-        <a:xfrm>
-          <a:off x="0" y="0"/>
-          <a:ext cx="0" cy="0"/>
-          <a:chOff x="0" y="0"/>
-          <a:chExt cx="0" cy="0"/>
-        </a:xfrm>
-      </p:grpSpPr>
-      <p:sp>
-        <p:nvSpPr>
-          <p:cNvPr id="2" name="Title 1"/>
-          <p:cNvSpPr>
-            <a:spLocks noGrp="1"/>
-          </p:cNvSpPr>
-          <p:nvPr>
-            <p:ph type="title"/>
-          </p:nvPr>
-        </p:nvSpPr>
-        <p:spPr/>
-        <p:txBody>
-          <a:bodyPr/>
-          <a:lstStyle/>
-          <a:p>
-            <a:r>
-              <a:rPr lang="en-SG" dirty="0" smtClean="0"/>
-              <a:t>Final</a:t>
-            </a:r>
-            <a:endParaRPr lang="en-SG" dirty="0"/>
-          </a:p>
-        </p:txBody>
-      </p:sp>
-      <p:sp>
-        <p:nvSpPr>
-          <p:cNvPr id="3" name="Content Placeholder 2"/>
-          <p:cNvSpPr>
-            <a:spLocks noGrp="1"/>
-          </p:cNvSpPr>
-          <p:nvPr>
-            <p:ph idx="1"/>
-          </p:nvPr>
-        </p:nvSpPr>
-        <p:spPr/>
-        <p:txBody>
-          <a:bodyPr/>
-          <a:lstStyle/>
-          <a:p>
-            <a:r>
-              <a:rPr lang="en-SG" dirty="0" smtClean="0"/>
-              <a:t>Polished Version of Beta</a:t>
-            </a:r>
-            <a:endParaRPr lang="en-SG" dirty="0"/>
-          </a:p>
-        </p:txBody>
-      </p:sp>
-    </p:spTree>
-    <p:extLst>
-      <p:ext uri="{BB962C8B-B14F-4D97-AF65-F5344CB8AC3E}">
-        <p14:creationId xmlns:p14="http://schemas.microsoft.com/office/powerpoint/2010/main" val="1230661559"/>
-      </p:ext>
-    </p:extLst>
-  </p:cSld>
-  <p:clrMapOvr>
-    <a:masterClrMapping/>
-  </p:clrMapOvr>
+  <p:timing>
+    <p:tnLst>
+      <p:par>
+        <p:cTn id="1" dur="indefinite" restart="never" nodeType="tmRoot"/>
+      </p:par>
+    </p:tnLst>
+  </p:timing>
 </p:sld>
 </file>
 
@@ -6323,40 +6165,76 @@
         </p:nvSpPr>
         <p:spPr/>
         <p:txBody>
+          <a:bodyPr>
+            <a:normAutofit/>
+          </a:bodyPr>
+          <a:lstStyle/>
+          <a:p>
+            <a:r>
+              <a:rPr lang="en-SG" dirty="0" smtClean="0"/>
+              <a:t>Game Play Features</a:t>
+            </a:r>
+            <a:endParaRPr lang="en-SG" dirty="0"/>
+          </a:p>
+        </p:txBody>
+      </p:sp>
+      <p:sp>
+        <p:nvSpPr>
+          <p:cNvPr id="3" name="Content Placeholder 2"/>
+          <p:cNvSpPr>
+            <a:spLocks noGrp="1"/>
+          </p:cNvSpPr>
+          <p:nvPr>
+            <p:ph idx="1"/>
+          </p:nvPr>
+        </p:nvSpPr>
+        <p:spPr/>
+        <p:txBody>
           <a:bodyPr/>
           <a:lstStyle/>
           <a:p>
             <a:r>
               <a:rPr lang="en-SG" dirty="0" smtClean="0"/>
-              <a:t>Technical Challenges</a:t>
-            </a:r>
-            <a:endParaRPr lang="en-SG" dirty="0"/>
-          </a:p>
-        </p:txBody>
-      </p:sp>
-      <p:sp>
-        <p:nvSpPr>
-          <p:cNvPr id="3" name="Content Placeholder 2"/>
-          <p:cNvSpPr>
-            <a:spLocks noGrp="1"/>
-          </p:cNvSpPr>
-          <p:nvPr>
-            <p:ph idx="1"/>
-          </p:nvPr>
-        </p:nvSpPr>
-        <p:spPr/>
-        <p:txBody>
-          <a:bodyPr/>
-          <a:lstStyle/>
-          <a:p>
-            <a:endParaRPr lang="en-SG"/>
+              <a:t>3 Exclusive Modes</a:t>
+            </a:r>
+          </a:p>
+          <a:p>
+            <a:pPr lvl="1"/>
+            <a:r>
+              <a:rPr lang="en-SG" dirty="0" smtClean="0"/>
+              <a:t>Training – 10 Levels of Tracks of Varying difficulty</a:t>
+            </a:r>
+          </a:p>
+          <a:p>
+            <a:pPr lvl="1"/>
+            <a:r>
+              <a:rPr lang="en-SG" dirty="0" smtClean="0"/>
+              <a:t>Multiplayer – Outrun</a:t>
+            </a:r>
+          </a:p>
+          <a:p>
+            <a:pPr lvl="1"/>
+            <a:r>
+              <a:rPr lang="en-SG" dirty="0" smtClean="0"/>
+              <a:t>Multiplayer – Bomb Tag</a:t>
+            </a:r>
+          </a:p>
+          <a:p>
+            <a:r>
+              <a:rPr lang="en-SG" dirty="0" smtClean="0"/>
+              <a:t>Level Editor</a:t>
+            </a:r>
+          </a:p>
+          <a:p>
+            <a:pPr lvl="1"/>
+            <a:endParaRPr lang="en-SG" dirty="0" smtClean="0"/>
           </a:p>
         </p:txBody>
       </p:sp>
     </p:spTree>
     <p:extLst>
       <p:ext uri="{BB962C8B-B14F-4D97-AF65-F5344CB8AC3E}">
-        <p14:creationId xmlns:p14="http://schemas.microsoft.com/office/powerpoint/2010/main" val="1205851689"/>
+        <p14:creationId xmlns:p14="http://schemas.microsoft.com/office/powerpoint/2010/main" val="394069936"/>
       </p:ext>
     </p:extLst>
   </p:cSld>
@@ -6416,14 +6294,14 @@
             <p:ph idx="1"/>
             <p:extLst>
               <p:ext uri="{D42A27DB-BD31-4B8C-83A1-F6EECF244321}">
-                <p14:modId xmlns:p14="http://schemas.microsoft.com/office/powerpoint/2010/main" val="2962028738"/>
+                <p14:modId xmlns:p14="http://schemas.microsoft.com/office/powerpoint/2010/main" val="1000844756"/>
               </p:ext>
             </p:extLst>
           </p:nvPr>
         </p:nvGraphicFramePr>
         <p:xfrm>
-          <a:off x="1295400" y="2557463"/>
-          <a:ext cx="9601200" cy="2966720"/>
+          <a:off x="1295402" y="2108887"/>
+          <a:ext cx="9601200" cy="4047798"/>
         </p:xfrm>
         <a:graphic>
           <a:graphicData uri="http://schemas.openxmlformats.org/drawingml/2006/table">
@@ -6432,24 +6310,26 @@
                 <a:tableStyleId>{5C22544A-7EE6-4342-B048-85BDC9FD1C3A}</a:tableStyleId>
               </a:tblPr>
               <a:tblGrid>
-                <a:gridCol w="4800600"/>
-                <a:gridCol w="4800600"/>
+                <a:gridCol w="2400300"/>
+                <a:gridCol w="2499154"/>
+                <a:gridCol w="2301446"/>
+                <a:gridCol w="2400300"/>
               </a:tblGrid>
-              <a:tr h="370840">
+              <a:tr h="461318">
                 <a:tc>
                   <a:txBody>
                     <a:bodyPr/>
                     <a:lstStyle/>
                     <a:p>
                       <a:r>
-                        <a:rPr lang="en-SG" dirty="0" smtClean="0"/>
+                        <a:rPr lang="en-SG" sz="1200" dirty="0" smtClean="0"/>
                         <a:t>First</a:t>
                       </a:r>
                       <a:r>
-                        <a:rPr lang="en-SG" baseline="0" dirty="0" smtClean="0"/>
+                        <a:rPr lang="en-SG" sz="1200" baseline="0" dirty="0" smtClean="0"/>
                         <a:t> Playable</a:t>
                       </a:r>
-                      <a:endParaRPr lang="en-SG" dirty="0"/>
+                      <a:endParaRPr lang="en-SG" sz="1200" dirty="0"/>
                     </a:p>
                   </a:txBody>
                   <a:tcPr/>
@@ -6460,10 +6340,327 @@
                     <a:lstStyle/>
                     <a:p>
                       <a:r>
-                        <a:rPr lang="en-SG" dirty="0" smtClean="0"/>
-                        <a:t>Finals</a:t>
+                        <a:rPr lang="en-US" sz="1200" dirty="0" smtClean="0"/>
+                        <a:t>Alpha</a:t>
                       </a:r>
-                      <a:endParaRPr lang="en-SG" dirty="0"/>
+                      <a:endParaRPr lang="en-SG" sz="1200" dirty="0"/>
+                    </a:p>
+                  </a:txBody>
+                  <a:tcPr/>
+                </a:tc>
+                <a:tc>
+                  <a:txBody>
+                    <a:bodyPr/>
+                    <a:lstStyle/>
+                    <a:p>
+                      <a:r>
+                        <a:rPr lang="en-US" sz="1200" dirty="0" smtClean="0"/>
+                        <a:t>Beta</a:t>
+                      </a:r>
+                      <a:endParaRPr lang="en-SG" sz="1200" dirty="0"/>
+                    </a:p>
+                  </a:txBody>
+                  <a:tcPr/>
+                </a:tc>
+                <a:tc>
+                  <a:txBody>
+                    <a:bodyPr/>
+                    <a:lstStyle/>
+                    <a:p>
+                      <a:r>
+                        <a:rPr lang="en-US" sz="1200" dirty="0" smtClean="0"/>
+                        <a:t>Final</a:t>
+                      </a:r>
+                      <a:endParaRPr lang="en-SG" sz="1200" dirty="0"/>
+                    </a:p>
+                  </a:txBody>
+                  <a:tcPr/>
+                </a:tc>
+              </a:tr>
+              <a:tr h="383308">
+                <a:tc>
+                  <a:txBody>
+                    <a:bodyPr/>
+                    <a:lstStyle/>
+                    <a:p>
+                      <a:pPr marL="0" marR="0" lvl="1" indent="0" algn="l" defTabSz="457200" rtl="0" eaLnBrk="1" fontAlgn="auto" latinLnBrk="0" hangingPunct="1">
+                        <a:lnSpc>
+                          <a:spcPct val="100000"/>
+                        </a:lnSpc>
+                        <a:spcBef>
+                          <a:spcPts val="0"/>
+                        </a:spcBef>
+                        <a:spcAft>
+                          <a:spcPts val="0"/>
+                        </a:spcAft>
+                        <a:buClrTx/>
+                        <a:buSzTx/>
+                        <a:buFontTx/>
+                        <a:buNone/>
+                        <a:tabLst/>
+                        <a:defRPr/>
+                      </a:pPr>
+                      <a:r>
+                        <a:rPr lang="en-SG" sz="1200" u="sng" dirty="0" smtClean="0"/>
+                        <a:t>Vehicle basic movement</a:t>
+                      </a:r>
+                      <a:endParaRPr lang="en-SG" sz="1200" u="sng" dirty="0"/>
+                    </a:p>
+                  </a:txBody>
+                  <a:tcPr/>
+                </a:tc>
+                <a:tc>
+                  <a:txBody>
+                    <a:bodyPr/>
+                    <a:lstStyle/>
+                    <a:p>
+                      <a:r>
+                        <a:rPr lang="en-SG" sz="1200" b="0" u="sng" dirty="0" smtClean="0"/>
+                        <a:t>Single Player Mode Complete</a:t>
+                      </a:r>
+                    </a:p>
+                    <a:p>
+                      <a:pPr marL="171450" indent="-171450">
+                        <a:buFont typeface="Arial" panose="020B0604020202020204" pitchFamily="34" charset="0"/>
+                        <a:buChar char="•"/>
+                      </a:pPr>
+                      <a:r>
+                        <a:rPr lang="en-SG" sz="1200" u="none" dirty="0" smtClean="0"/>
+                        <a:t>5 – 7 Tracks</a:t>
+                      </a:r>
+                      <a:endParaRPr lang="en-SG" sz="1200" u="none" dirty="0"/>
+                    </a:p>
+                  </a:txBody>
+                  <a:tcPr/>
+                </a:tc>
+                <a:tc>
+                  <a:txBody>
+                    <a:bodyPr/>
+                    <a:lstStyle/>
+                    <a:p>
+                      <a:r>
+                        <a:rPr lang="en-SG" sz="1200" u="sng" dirty="0" smtClean="0"/>
+                        <a:t>Single Player Mode</a:t>
+                      </a:r>
+                    </a:p>
+                    <a:p>
+                      <a:pPr marL="171450" indent="-171450">
+                        <a:buFont typeface="Arial" panose="020B0604020202020204" pitchFamily="34" charset="0"/>
+                        <a:buChar char="•"/>
+                      </a:pPr>
+                      <a:r>
+                        <a:rPr lang="en-SG" sz="1200" dirty="0" smtClean="0"/>
+                        <a:t>10 Tracks </a:t>
+                      </a:r>
+                    </a:p>
+                    <a:p>
+                      <a:pPr marL="171450" indent="-171450">
+                        <a:buFont typeface="Arial" panose="020B0604020202020204" pitchFamily="34" charset="0"/>
+                        <a:buChar char="•"/>
+                      </a:pPr>
+                      <a:r>
+                        <a:rPr lang="en-SG" sz="1200" dirty="0" smtClean="0"/>
+                        <a:t> Possible High-score Tracking</a:t>
+                      </a:r>
+                    </a:p>
+                    <a:p>
+                      <a:endParaRPr lang="en-SG" sz="1200" dirty="0"/>
+                    </a:p>
+                  </a:txBody>
+                  <a:tcPr/>
+                </a:tc>
+                <a:tc>
+                  <a:txBody>
+                    <a:bodyPr/>
+                    <a:lstStyle/>
+                    <a:p>
+                      <a:pPr marL="0" marR="0" indent="0" algn="l" defTabSz="457200" rtl="0" eaLnBrk="1" fontAlgn="auto" latinLnBrk="0" hangingPunct="1">
+                        <a:lnSpc>
+                          <a:spcPct val="100000"/>
+                        </a:lnSpc>
+                        <a:spcBef>
+                          <a:spcPts val="0"/>
+                        </a:spcBef>
+                        <a:spcAft>
+                          <a:spcPts val="0"/>
+                        </a:spcAft>
+                        <a:buClrTx/>
+                        <a:buSzTx/>
+                        <a:buFontTx/>
+                        <a:buNone/>
+                        <a:tabLst/>
+                        <a:defRPr/>
+                      </a:pPr>
+                      <a:r>
+                        <a:rPr lang="en-SG" sz="1200" u="sng" dirty="0" smtClean="0"/>
+                        <a:t>Polished Version of Beta</a:t>
+                      </a:r>
+                    </a:p>
+                    <a:p>
+                      <a:endParaRPr lang="en-SG" sz="1200" dirty="0"/>
+                    </a:p>
+                  </a:txBody>
+                  <a:tcPr/>
+                </a:tc>
+              </a:tr>
+              <a:tr h="469805">
+                <a:tc>
+                  <a:txBody>
+                    <a:bodyPr/>
+                    <a:lstStyle/>
+                    <a:p>
+                      <a:pPr marL="0" marR="0" lvl="1" indent="0" algn="l" defTabSz="457200" rtl="0" eaLnBrk="1" fontAlgn="auto" latinLnBrk="0" hangingPunct="1">
+                        <a:lnSpc>
+                          <a:spcPct val="100000"/>
+                        </a:lnSpc>
+                        <a:spcBef>
+                          <a:spcPts val="0"/>
+                        </a:spcBef>
+                        <a:spcAft>
+                          <a:spcPts val="0"/>
+                        </a:spcAft>
+                        <a:buClrTx/>
+                        <a:buSzTx/>
+                        <a:buFontTx/>
+                        <a:buNone/>
+                        <a:tabLst/>
+                        <a:defRPr/>
+                      </a:pPr>
+                      <a:r>
+                        <a:rPr lang="en-SG" sz="1200" u="sng" dirty="0" smtClean="0"/>
+                        <a:t>Single Player</a:t>
+                      </a:r>
+                    </a:p>
+                    <a:p>
+                      <a:pPr marL="171450" marR="0" lvl="1" indent="-171450" algn="l" defTabSz="457200" rtl="0" eaLnBrk="1" fontAlgn="auto" latinLnBrk="0" hangingPunct="1">
+                        <a:lnSpc>
+                          <a:spcPct val="100000"/>
+                        </a:lnSpc>
+                        <a:spcBef>
+                          <a:spcPts val="0"/>
+                        </a:spcBef>
+                        <a:spcAft>
+                          <a:spcPts val="0"/>
+                        </a:spcAft>
+                        <a:buClrTx/>
+                        <a:buSzTx/>
+                        <a:buFont typeface="Arial" panose="020B0604020202020204" pitchFamily="34" charset="0"/>
+                        <a:buChar char="•"/>
+                        <a:tabLst/>
+                        <a:defRPr/>
+                      </a:pPr>
+                      <a:r>
+                        <a:rPr lang="en-SG" sz="1200" dirty="0" smtClean="0"/>
+                        <a:t>1-2 Tracks for Testing</a:t>
+                      </a:r>
+                      <a:endParaRPr lang="en-SG" sz="1200" dirty="0" smtClean="0"/>
+                    </a:p>
+                  </a:txBody>
+                  <a:tcPr/>
+                </a:tc>
+                <a:tc>
+                  <a:txBody>
+                    <a:bodyPr/>
+                    <a:lstStyle/>
+                    <a:p>
+                      <a:pPr marL="0" marR="0" indent="0" algn="l" defTabSz="457200" rtl="0" eaLnBrk="1" fontAlgn="auto" latinLnBrk="0" hangingPunct="1">
+                        <a:lnSpc>
+                          <a:spcPct val="100000"/>
+                        </a:lnSpc>
+                        <a:spcBef>
+                          <a:spcPts val="0"/>
+                        </a:spcBef>
+                        <a:spcAft>
+                          <a:spcPts val="0"/>
+                        </a:spcAft>
+                        <a:buClrTx/>
+                        <a:buSzTx/>
+                        <a:buFontTx/>
+                        <a:buNone/>
+                        <a:tabLst/>
+                        <a:defRPr/>
+                      </a:pPr>
+                      <a:r>
+                        <a:rPr lang="en-SG" sz="1200" u="sng" dirty="0" smtClean="0"/>
+                        <a:t>Multiplayer – Bomb Tag Implemented</a:t>
+                      </a:r>
+                    </a:p>
+                    <a:p>
+                      <a:pPr marL="171450" marR="0" lvl="1" indent="-171450" algn="l" defTabSz="457200" rtl="0" eaLnBrk="1" fontAlgn="auto" latinLnBrk="0" hangingPunct="1">
+                        <a:lnSpc>
+                          <a:spcPct val="100000"/>
+                        </a:lnSpc>
+                        <a:spcBef>
+                          <a:spcPts val="0"/>
+                        </a:spcBef>
+                        <a:spcAft>
+                          <a:spcPts val="0"/>
+                        </a:spcAft>
+                        <a:buClrTx/>
+                        <a:buSzTx/>
+                        <a:buFont typeface="Arial" panose="020B0604020202020204" pitchFamily="34" charset="0"/>
+                        <a:buChar char="•"/>
+                        <a:tabLst/>
+                        <a:defRPr/>
+                      </a:pPr>
+                      <a:r>
+                        <a:rPr lang="en-SG" sz="1200" dirty="0" smtClean="0"/>
+                        <a:t>2 Power-ups</a:t>
+                      </a:r>
+                      <a:endParaRPr lang="en-SG" sz="1200" dirty="0"/>
+                    </a:p>
+                  </a:txBody>
+                  <a:tcPr/>
+                </a:tc>
+                <a:tc>
+                  <a:txBody>
+                    <a:bodyPr/>
+                    <a:lstStyle/>
+                    <a:p>
+                      <a:r>
+                        <a:rPr lang="en-SG" sz="1200" u="sng" dirty="0" smtClean="0"/>
+                        <a:t>Multiplayer – Bomb Tag Complete</a:t>
+                      </a:r>
+                    </a:p>
+                    <a:p>
+                      <a:pPr marL="171450" indent="-171450">
+                        <a:buFont typeface="Arial" panose="020B0604020202020204" pitchFamily="34" charset="0"/>
+                        <a:buChar char="•"/>
+                      </a:pPr>
+                      <a:r>
+                        <a:rPr lang="en-SG" sz="1200" dirty="0" smtClean="0"/>
+                        <a:t>3 Power-ups</a:t>
+                      </a:r>
+                      <a:endParaRPr lang="en-SG" sz="1200" dirty="0"/>
+                    </a:p>
+                    <a:p>
+                      <a:pPr marL="171450" indent="-171450">
+                        <a:buFont typeface="Arial" panose="020B0604020202020204" pitchFamily="34" charset="0"/>
+                        <a:buChar char="•"/>
+                      </a:pPr>
+                      <a:r>
+                        <a:rPr lang="en-US" sz="1200" dirty="0" smtClean="0"/>
+                        <a:t>Environment</a:t>
+                      </a:r>
+                      <a:r>
+                        <a:rPr lang="en-US" sz="1200" baseline="0" dirty="0" smtClean="0"/>
+                        <a:t> AI</a:t>
+                      </a:r>
+                      <a:endParaRPr lang="en-SG" sz="1200" dirty="0" smtClean="0"/>
+                    </a:p>
+                  </a:txBody>
+                  <a:tcPr/>
+                </a:tc>
+                <a:tc>
+                  <a:txBody>
+                    <a:bodyPr/>
+                    <a:lstStyle/>
+                    <a:p>
+                      <a:r>
+                        <a:rPr lang="en-US" sz="1200" u="sng" dirty="0" smtClean="0"/>
+                        <a:t>Game Balancing</a:t>
+                      </a:r>
+                      <a:endParaRPr lang="en-SG" sz="1200" u="sng" dirty="0"/>
                     </a:p>
                   </a:txBody>
                   <a:tcPr/>
@@ -6475,7 +6672,27 @@
                     <a:bodyPr/>
                     <a:lstStyle/>
                     <a:p>
-                      <a:endParaRPr lang="en-SG"/>
+                      <a:r>
+                        <a:rPr lang="en-US" sz="1200" u="sng" dirty="0" smtClean="0">
+                          <a:effectLst/>
+                        </a:rPr>
+                        <a:t>Multiplayer</a:t>
+                      </a:r>
+                    </a:p>
+                    <a:p>
+                      <a:pPr marL="171450" indent="-171450">
+                        <a:buFont typeface="Arial" panose="020B0604020202020204" pitchFamily="34" charset="0"/>
+                        <a:buChar char="•"/>
+                      </a:pPr>
+                      <a:r>
+                        <a:rPr lang="en-US" sz="1200" dirty="0" smtClean="0"/>
+                        <a:t>Multi-play</a:t>
+                      </a:r>
+                      <a:r>
+                        <a:rPr lang="en-US" sz="1200" baseline="0" dirty="0" smtClean="0"/>
+                        <a:t> in Single Player Environment</a:t>
+                      </a:r>
+                      <a:endParaRPr lang="en-SG" sz="1200" dirty="0"/>
                     </a:p>
                   </a:txBody>
                   <a:tcPr/>
@@ -6485,7 +6702,116 @@
                     <a:bodyPr/>
                     <a:lstStyle/>
                     <a:p>
-                      <a:endParaRPr lang="en-SG"/>
+                      <a:r>
+                        <a:rPr lang="en-SG" sz="1200" u="sng" dirty="0" smtClean="0"/>
+                        <a:t>Multiplayer – Outrun Implemented</a:t>
+                      </a:r>
+                    </a:p>
+                    <a:p>
+                      <a:pPr marL="171450" indent="-171450">
+                        <a:buFont typeface="Arial" panose="020B0604020202020204" pitchFamily="34" charset="0"/>
+                        <a:buChar char="•"/>
+                      </a:pPr>
+                      <a:r>
+                        <a:rPr lang="en-US" sz="1200" dirty="0" smtClean="0"/>
+                        <a:t>Out</a:t>
+                      </a:r>
+                      <a:r>
+                        <a:rPr lang="en-US" sz="1200" baseline="0" dirty="0" smtClean="0"/>
+                        <a:t> Of Bounds(OOB) Hit-box</a:t>
+                      </a:r>
+                      <a:r>
+                        <a:rPr lang="en-SG" sz="1200" baseline="0" dirty="0" smtClean="0"/>
+                        <a:t> Implemented</a:t>
+                      </a:r>
+                      <a:endParaRPr lang="en-US" sz="1200" baseline="0" dirty="0" smtClean="0"/>
+                    </a:p>
+                  </a:txBody>
+                  <a:tcPr/>
+                </a:tc>
+                <a:tc>
+                  <a:txBody>
+                    <a:bodyPr/>
+                    <a:lstStyle/>
+                    <a:p>
+                      <a:pPr marL="0" marR="0" indent="0" algn="l" defTabSz="457200" rtl="0" eaLnBrk="1" fontAlgn="auto" latinLnBrk="0" hangingPunct="1">
+                        <a:lnSpc>
+                          <a:spcPct val="100000"/>
+                        </a:lnSpc>
+                        <a:spcBef>
+                          <a:spcPts val="0"/>
+                        </a:spcBef>
+                        <a:spcAft>
+                          <a:spcPts val="0"/>
+                        </a:spcAft>
+                        <a:buClrTx/>
+                        <a:buSzTx/>
+                        <a:buFontTx/>
+                        <a:buNone/>
+                        <a:tabLst/>
+                        <a:defRPr/>
+                      </a:pPr>
+                      <a:r>
+                        <a:rPr lang="en-SG" sz="1200" u="sng" dirty="0" smtClean="0"/>
+                        <a:t>Multiplayer – Outrun Complete</a:t>
+                      </a:r>
+                    </a:p>
+                    <a:p>
+                      <a:pPr marL="171450" marR="0" indent="-171450" algn="l" defTabSz="457200" rtl="0" eaLnBrk="1" fontAlgn="auto" latinLnBrk="0" hangingPunct="1">
+                        <a:lnSpc>
+                          <a:spcPct val="100000"/>
+                        </a:lnSpc>
+                        <a:spcBef>
+                          <a:spcPts val="0"/>
+                        </a:spcBef>
+                        <a:spcAft>
+                          <a:spcPts val="0"/>
+                        </a:spcAft>
+                        <a:buClrTx/>
+                        <a:buSzTx/>
+                        <a:buFont typeface="Arial" panose="020B0604020202020204" pitchFamily="34" charset="0"/>
+                        <a:buChar char="•"/>
+                        <a:tabLst/>
+                        <a:defRPr/>
+                      </a:pPr>
+                      <a:r>
+                        <a:rPr lang="en-US" sz="1200" dirty="0" smtClean="0"/>
+                        <a:t>Power</a:t>
+                      </a:r>
+                      <a:r>
+                        <a:rPr lang="en-US" sz="1200" baseline="0" dirty="0" smtClean="0"/>
+                        <a:t>-Ups</a:t>
+                      </a:r>
+                    </a:p>
+                    <a:p>
+                      <a:pPr marL="171450" marR="0" indent="-171450" algn="l" defTabSz="457200" rtl="0" eaLnBrk="1" fontAlgn="auto" latinLnBrk="0" hangingPunct="1">
+                        <a:lnSpc>
+                          <a:spcPct val="100000"/>
+                        </a:lnSpc>
+                        <a:spcBef>
+                          <a:spcPts val="0"/>
+                        </a:spcBef>
+                        <a:spcAft>
+                          <a:spcPts val="0"/>
+                        </a:spcAft>
+                        <a:buClrTx/>
+                        <a:buSzTx/>
+                        <a:buFont typeface="Arial" panose="020B0604020202020204" pitchFamily="34" charset="0"/>
+                        <a:buChar char="•"/>
+                        <a:tabLst/>
+                        <a:defRPr/>
+                      </a:pPr>
+                      <a:endParaRPr lang="en-SG" sz="1200" dirty="0"/>
+                    </a:p>
+                  </a:txBody>
+                  <a:tcPr/>
+                </a:tc>
+                <a:tc>
+                  <a:txBody>
+                    <a:bodyPr/>
+                    <a:lstStyle/>
+                    <a:p>
+                      <a:endParaRPr lang="en-SG" sz="1200" dirty="0"/>
                     </a:p>
                   </a:txBody>
                   <a:tcPr/>
@@ -6497,7 +6823,7 @@
                     <a:bodyPr/>
                     <a:lstStyle/>
                     <a:p>
-                      <a:endParaRPr lang="en-SG"/>
+                      <a:endParaRPr lang="en-SG" sz="1200" dirty="0"/>
                     </a:p>
                   </a:txBody>
                   <a:tcPr/>
@@ -6507,19 +6833,7 @@
                     <a:bodyPr/>
                     <a:lstStyle/>
                     <a:p>
-                      <a:endParaRPr lang="en-SG"/>
-                    </a:p>
-                  </a:txBody>
-                  <a:tcPr/>
-                </a:tc>
-              </a:tr>
-              <a:tr h="370840">
-                <a:tc>
-                  <a:txBody>
-                    <a:bodyPr/>
-                    <a:lstStyle/>
-                    <a:p>
-                      <a:endParaRPr lang="en-SG"/>
+                      <a:endParaRPr lang="en-SG" sz="1200" dirty="0"/>
                     </a:p>
                   </a:txBody>
                   <a:tcPr/>
@@ -6529,19 +6843,11 @@
                     <a:bodyPr/>
                     <a:lstStyle/>
                     <a:p>
-                      <a:endParaRPr lang="en-SG"/>
-                    </a:p>
-                  </a:txBody>
-                  <a:tcPr/>
-                </a:tc>
-              </a:tr>
-              <a:tr h="370840">
-                <a:tc>
-                  <a:txBody>
-                    <a:bodyPr/>
-                    <a:lstStyle/>
-                    <a:p>
-                      <a:endParaRPr lang="en-SG"/>
+                      <a:r>
+                        <a:rPr lang="en-US" sz="1200" u="sng" dirty="0" smtClean="0"/>
+                        <a:t>Level Editor(Tentative)</a:t>
+                      </a:r>
+                      <a:endParaRPr lang="en-SG" sz="1200" u="sng" dirty="0"/>
                     </a:p>
                   </a:txBody>
                   <a:tcPr/>
@@ -6551,29 +6857,7 @@
                     <a:bodyPr/>
                     <a:lstStyle/>
                     <a:p>
-                      <a:endParaRPr lang="en-SG"/>
-                    </a:p>
-                  </a:txBody>
-                  <a:tcPr/>
-                </a:tc>
-              </a:tr>
-              <a:tr h="370840">
-                <a:tc>
-                  <a:txBody>
-                    <a:bodyPr/>
-                    <a:lstStyle/>
-                    <a:p>
-                      <a:endParaRPr lang="en-SG"/>
-                    </a:p>
-                  </a:txBody>
-                  <a:tcPr/>
-                </a:tc>
-                <a:tc>
-                  <a:txBody>
-                    <a:bodyPr/>
-                    <a:lstStyle/>
-                    <a:p>
-                      <a:endParaRPr lang="en-SG"/>
+                      <a:endParaRPr lang="en-SG" sz="1200" dirty="0"/>
                     </a:p>
                   </a:txBody>
                   <a:tcPr/>
@@ -6595,7 +6879,27 @@
                     <a:bodyPr/>
                     <a:lstStyle/>
                     <a:p>
-                      <a:endParaRPr lang="en-SG"/>
+                      <a:endParaRPr lang="en-SG" dirty="0"/>
+                    </a:p>
+                  </a:txBody>
+                  <a:tcPr/>
+                </a:tc>
+                <a:tc>
+                  <a:txBody>
+                    <a:bodyPr/>
+                    <a:lstStyle/>
+                    <a:p>
+                      <a:endParaRPr lang="en-SG" dirty="0"/>
+                    </a:p>
+                  </a:txBody>
+                  <a:tcPr/>
+                </a:tc>
+                <a:tc>
+                  <a:txBody>
+                    <a:bodyPr/>
+                    <a:lstStyle/>
+                    <a:p>
+                      <a:endParaRPr lang="en-SG" dirty="0"/>
                     </a:p>
                   </a:txBody>
                   <a:tcPr/>
@@ -6617,7 +6921,69 @@
                     <a:bodyPr/>
                     <a:lstStyle/>
                     <a:p>
-                      <a:endParaRPr lang="en-SG"/>
+                      <a:endParaRPr lang="en-SG" dirty="0"/>
+                    </a:p>
+                  </a:txBody>
+                  <a:tcPr/>
+                </a:tc>
+                <a:tc>
+                  <a:txBody>
+                    <a:bodyPr/>
+                    <a:lstStyle/>
+                    <a:p>
+                      <a:endParaRPr lang="en-SG" dirty="0"/>
+                    </a:p>
+                  </a:txBody>
+                  <a:tcPr/>
+                </a:tc>
+                <a:tc>
+                  <a:txBody>
+                    <a:bodyPr/>
+                    <a:lstStyle/>
+                    <a:p>
+                      <a:endParaRPr lang="en-SG" dirty="0"/>
+                    </a:p>
+                  </a:txBody>
+                  <a:tcPr/>
+                </a:tc>
+              </a:tr>
+              <a:tr h="370840">
+                <a:tc>
+                  <a:txBody>
+                    <a:bodyPr/>
+                    <a:lstStyle/>
+                    <a:p>
+                      <a:endParaRPr lang="en-SG" dirty="0"/>
+                    </a:p>
+                  </a:txBody>
+                  <a:tcPr/>
+                </a:tc>
+                <a:tc>
+                  <a:txBody>
+                    <a:bodyPr/>
+                    <a:lstStyle/>
+                    <a:p>
+                      <a:endParaRPr lang="en-SG" dirty="0"/>
+                    </a:p>
+                  </a:txBody>
+                  <a:tcPr/>
+                </a:tc>
+                <a:tc>
+                  <a:txBody>
+                    <a:bodyPr/>
+                    <a:lstStyle/>
+                    <a:p>
+                      <a:endParaRPr lang="en-SG" dirty="0"/>
+                    </a:p>
+                  </a:txBody>
+                  <a:tcPr/>
+                </a:tc>
+                <a:tc>
+                  <a:txBody>
+                    <a:bodyPr/>
+                    <a:lstStyle/>
+                    <a:p>
+                      <a:endParaRPr lang="en-SG" dirty="0"/>
                     </a:p>
                   </a:txBody>
                   <a:tcPr/>
@@ -6637,6 +7003,13 @@
   <p:clrMapOvr>
     <a:masterClrMapping/>
   </p:clrMapOvr>
+  <p:timing>
+    <p:tnLst>
+      <p:par>
+        <p:cTn id="1" dur="indefinite" restart="never" nodeType="tmRoot"/>
+      </p:par>
+    </p:tnLst>
+  </p:timing>
 </p:sld>
 </file>
 
@@ -6674,7 +7047,7 @@
           <a:p>
             <a:r>
               <a:rPr lang="en-SG" dirty="0" smtClean="0"/>
-              <a:t>End</a:t>
+              <a:t>Technical Challenges</a:t>
             </a:r>
             <a:endParaRPr lang="en-SG" dirty="0"/>
           </a:p>
@@ -6692,41 +7065,30 @@
         </p:nvSpPr>
         <p:spPr/>
         <p:txBody>
-          <a:bodyPr>
-            <a:normAutofit/>
-          </a:bodyPr>
-          <a:lstStyle/>
-          <a:p>
-            <a:pPr marL="0" indent="0" algn="ctr">
-              <a:buNone/>
-            </a:pPr>
-            <a:r>
-              <a:rPr lang="en-SG" sz="4400" dirty="0" smtClean="0"/>
-              <a:t>Thank you for your Attention.</a:t>
-            </a:r>
-          </a:p>
-          <a:p>
-            <a:pPr marL="0" indent="0" algn="ctr">
-              <a:buNone/>
-            </a:pPr>
-            <a:r>
-              <a:rPr lang="en-SG" sz="4400" dirty="0" smtClean="0"/>
-              <a:t>Questions?</a:t>
-            </a:r>
-            <a:endParaRPr lang="en-SG" sz="4400" dirty="0"/>
+          <a:bodyPr/>
+          <a:lstStyle/>
+          <a:p>
+            <a:endParaRPr lang="en-SG"/>
           </a:p>
         </p:txBody>
       </p:sp>
     </p:spTree>
     <p:extLst>
       <p:ext uri="{BB962C8B-B14F-4D97-AF65-F5344CB8AC3E}">
-        <p14:creationId xmlns:p14="http://schemas.microsoft.com/office/powerpoint/2010/main" val="4047622791"/>
+        <p14:creationId xmlns:p14="http://schemas.microsoft.com/office/powerpoint/2010/main" val="1205851689"/>
       </p:ext>
     </p:extLst>
   </p:cSld>
   <p:clrMapOvr>
     <a:masterClrMapping/>
   </p:clrMapOvr>
+  <p:timing>
+    <p:tnLst>
+      <p:par>
+        <p:cTn id="1" dur="indefinite" restart="never" nodeType="tmRoot"/>
+      </p:par>
+    </p:tnLst>
+  </p:timing>
 </p:sld>
 </file>
 
@@ -6759,280 +7121,71 @@
         </p:nvSpPr>
         <p:spPr/>
         <p:txBody>
+          <a:bodyPr/>
+          <a:lstStyle/>
+          <a:p>
+            <a:r>
+              <a:rPr lang="en-SG" dirty="0" smtClean="0"/>
+              <a:t>End</a:t>
+            </a:r>
+            <a:endParaRPr lang="en-SG" dirty="0"/>
+          </a:p>
+        </p:txBody>
+      </p:sp>
+      <p:sp>
+        <p:nvSpPr>
+          <p:cNvPr id="3" name="Content Placeholder 2"/>
+          <p:cNvSpPr>
+            <a:spLocks noGrp="1"/>
+          </p:cNvSpPr>
+          <p:nvPr>
+            <p:ph idx="1"/>
+          </p:nvPr>
+        </p:nvSpPr>
+        <p:spPr/>
+        <p:txBody>
           <a:bodyPr>
             <a:normAutofit/>
           </a:bodyPr>
           <a:lstStyle/>
           <a:p>
-            <a:r>
-              <a:rPr lang="en-SG" dirty="0" smtClean="0"/>
-              <a:t>Game Play Features</a:t>
-            </a:r>
-            <a:endParaRPr lang="en-SG" dirty="0"/>
-          </a:p>
-        </p:txBody>
-      </p:sp>
-      <p:sp>
-        <p:nvSpPr>
-          <p:cNvPr id="3" name="Content Placeholder 2"/>
-          <p:cNvSpPr>
-            <a:spLocks noGrp="1"/>
-          </p:cNvSpPr>
-          <p:nvPr>
-            <p:ph idx="1"/>
-          </p:nvPr>
-        </p:nvSpPr>
-        <p:spPr/>
-        <p:txBody>
-          <a:bodyPr/>
-          <a:lstStyle/>
-          <a:p>
-            <a:r>
-              <a:rPr lang="en-SG" dirty="0" smtClean="0"/>
-              <a:t>3 Exclusive Modes</a:t>
-            </a:r>
-          </a:p>
-          <a:p>
-            <a:pPr lvl="1"/>
-            <a:r>
-              <a:rPr lang="en-SG" dirty="0" smtClean="0"/>
-              <a:t>Training – 10 Levels of Tracks of Varying difficulty</a:t>
-            </a:r>
-          </a:p>
-          <a:p>
-            <a:pPr lvl="1"/>
-            <a:r>
-              <a:rPr lang="en-SG" dirty="0" smtClean="0"/>
-              <a:t>Multiplayer – Outrun</a:t>
-            </a:r>
-          </a:p>
-          <a:p>
-            <a:pPr lvl="1"/>
-            <a:r>
-              <a:rPr lang="en-SG" dirty="0" smtClean="0"/>
-              <a:t>Multiplayer – Bomb Tag</a:t>
-            </a:r>
-          </a:p>
-          <a:p>
-            <a:r>
-              <a:rPr lang="en-SG" dirty="0" smtClean="0"/>
-              <a:t>Level Editor</a:t>
-            </a:r>
-          </a:p>
-          <a:p>
-            <a:pPr lvl="1"/>
-            <a:endParaRPr lang="en-SG" dirty="0" smtClean="0"/>
+            <a:pPr marL="0" indent="0" algn="ctr">
+              <a:buNone/>
+            </a:pPr>
+            <a:r>
+              <a:rPr lang="en-SG" sz="4400" dirty="0" smtClean="0"/>
+              <a:t>Thank you for your Attention.</a:t>
+            </a:r>
+          </a:p>
+          <a:p>
+            <a:pPr marL="0" indent="0" algn="ctr">
+              <a:buNone/>
+            </a:pPr>
+            <a:r>
+              <a:rPr lang="en-SG" sz="4400" dirty="0" smtClean="0"/>
+              <a:t>Questions?</a:t>
+            </a:r>
+            <a:endParaRPr lang="en-SG" sz="4400" dirty="0"/>
           </a:p>
         </p:txBody>
       </p:sp>
     </p:spTree>
     <p:extLst>
       <p:ext uri="{BB962C8B-B14F-4D97-AF65-F5344CB8AC3E}">
-        <p14:creationId xmlns:p14="http://schemas.microsoft.com/office/powerpoint/2010/main" val="394069936"/>
+        <p14:creationId xmlns:p14="http://schemas.microsoft.com/office/powerpoint/2010/main" val="4047622791"/>
       </p:ext>
     </p:extLst>
   </p:cSld>
   <p:clrMapOvr>
     <a:masterClrMapping/>
   </p:clrMapOvr>
-</p:sld>
-</file>
-
-<file path=ppt/slides/slide8.xml><?xml version="1.0" encoding="utf-8"?>
-<p:sld xmlns:a="http://schemas.openxmlformats.org/drawingml/2006/main" xmlns:r="http://schemas.openxmlformats.org/officeDocument/2006/relationships" xmlns:p="http://schemas.openxmlformats.org/presentationml/2006/main">
-  <p:cSld>
-    <p:spTree>
-      <p:nvGrpSpPr>
-        <p:cNvPr id="1" name=""/>
-        <p:cNvGrpSpPr/>
-        <p:nvPr/>
-      </p:nvGrpSpPr>
-      <p:grpSpPr>
-        <a:xfrm>
-          <a:off x="0" y="0"/>
-          <a:ext cx="0" cy="0"/>
-          <a:chOff x="0" y="0"/>
-          <a:chExt cx="0" cy="0"/>
-        </a:xfrm>
-      </p:grpSpPr>
-      <p:sp>
-        <p:nvSpPr>
-          <p:cNvPr id="2" name="Title 1"/>
-          <p:cNvSpPr>
-            <a:spLocks noGrp="1"/>
-          </p:cNvSpPr>
-          <p:nvPr>
-            <p:ph type="title"/>
-          </p:nvPr>
-        </p:nvSpPr>
-        <p:spPr/>
-        <p:txBody>
-          <a:bodyPr/>
-          <a:lstStyle/>
-          <a:p>
-            <a:r>
-              <a:rPr lang="en-SG" dirty="0" smtClean="0"/>
-              <a:t>First Playable</a:t>
-            </a:r>
-            <a:endParaRPr lang="en-SG" dirty="0"/>
-          </a:p>
-        </p:txBody>
-      </p:sp>
-      <p:sp>
-        <p:nvSpPr>
-          <p:cNvPr id="3" name="Content Placeholder 2"/>
-          <p:cNvSpPr>
-            <a:spLocks noGrp="1"/>
-          </p:cNvSpPr>
-          <p:nvPr>
-            <p:ph idx="1"/>
-          </p:nvPr>
-        </p:nvSpPr>
-        <p:spPr/>
-        <p:txBody>
-          <a:bodyPr/>
-          <a:lstStyle/>
-          <a:p>
-            <a:r>
-              <a:rPr lang="en-SG" dirty="0" smtClean="0"/>
-              <a:t>Basic Features Implemented</a:t>
-            </a:r>
-          </a:p>
-          <a:p>
-            <a:pPr lvl="1"/>
-            <a:r>
-              <a:rPr lang="en-SG" dirty="0" smtClean="0"/>
-              <a:t>Vehicle basic movement</a:t>
-            </a:r>
-          </a:p>
-          <a:p>
-            <a:pPr lvl="1"/>
-            <a:r>
-              <a:rPr lang="en-SG" dirty="0" smtClean="0"/>
-              <a:t>1-2 Tracks for Testing</a:t>
-            </a:r>
-            <a:endParaRPr lang="en-SG" dirty="0"/>
-          </a:p>
-        </p:txBody>
-      </p:sp>
-    </p:spTree>
-    <p:extLst>
-      <p:ext uri="{BB962C8B-B14F-4D97-AF65-F5344CB8AC3E}">
-        <p14:creationId xmlns:p14="http://schemas.microsoft.com/office/powerpoint/2010/main" val="970973903"/>
-      </p:ext>
-    </p:extLst>
-  </p:cSld>
-  <p:clrMapOvr>
-    <a:masterClrMapping/>
-  </p:clrMapOvr>
-</p:sld>
-</file>
-
-<file path=ppt/slides/slide9.xml><?xml version="1.0" encoding="utf-8"?>
-<p:sld xmlns:a="http://schemas.openxmlformats.org/drawingml/2006/main" xmlns:r="http://schemas.openxmlformats.org/officeDocument/2006/relationships" xmlns:p="http://schemas.openxmlformats.org/presentationml/2006/main">
-  <p:cSld>
-    <p:spTree>
-      <p:nvGrpSpPr>
-        <p:cNvPr id="1" name=""/>
-        <p:cNvGrpSpPr/>
-        <p:nvPr/>
-      </p:nvGrpSpPr>
-      <p:grpSpPr>
-        <a:xfrm>
-          <a:off x="0" y="0"/>
-          <a:ext cx="0" cy="0"/>
-          <a:chOff x="0" y="0"/>
-          <a:chExt cx="0" cy="0"/>
-        </a:xfrm>
-      </p:grpSpPr>
-      <p:sp>
-        <p:nvSpPr>
-          <p:cNvPr id="2" name="Title 1"/>
-          <p:cNvSpPr>
-            <a:spLocks noGrp="1"/>
-          </p:cNvSpPr>
-          <p:nvPr>
-            <p:ph type="title"/>
-          </p:nvPr>
-        </p:nvSpPr>
-        <p:spPr/>
-        <p:txBody>
-          <a:bodyPr/>
-          <a:lstStyle/>
-          <a:p>
-            <a:r>
-              <a:rPr lang="en-SG" dirty="0" smtClean="0"/>
-              <a:t>Alpha</a:t>
-            </a:r>
-            <a:endParaRPr lang="en-SG" dirty="0"/>
-          </a:p>
-        </p:txBody>
-      </p:sp>
-      <p:sp>
-        <p:nvSpPr>
-          <p:cNvPr id="3" name="Content Placeholder 2"/>
-          <p:cNvSpPr>
-            <a:spLocks noGrp="1"/>
-          </p:cNvSpPr>
-          <p:nvPr>
-            <p:ph idx="1"/>
-          </p:nvPr>
-        </p:nvSpPr>
-        <p:spPr/>
-        <p:txBody>
-          <a:bodyPr/>
-          <a:lstStyle/>
-          <a:p>
-            <a:r>
-              <a:rPr lang="en-SG" dirty="0" smtClean="0"/>
-              <a:t>Single Player Mode Complete</a:t>
-            </a:r>
-          </a:p>
-          <a:p>
-            <a:pPr lvl="1"/>
-            <a:r>
-              <a:rPr lang="en-SG" dirty="0" smtClean="0"/>
-              <a:t>5 – 7 Tracks</a:t>
-            </a:r>
-          </a:p>
-          <a:p>
-            <a:r>
-              <a:rPr lang="en-SG" dirty="0" smtClean="0"/>
-              <a:t>Multiplayer –Bomb Tag Implemented</a:t>
-            </a:r>
-          </a:p>
-          <a:p>
-            <a:pPr lvl="1"/>
-            <a:r>
-              <a:rPr lang="en-SG" dirty="0" smtClean="0"/>
-              <a:t>2 Power-ups</a:t>
-            </a:r>
-          </a:p>
-          <a:p>
-            <a:r>
-              <a:rPr lang="en-SG" dirty="0" smtClean="0"/>
-              <a:t>Multiplayer – Outrun Implemented</a:t>
-            </a:r>
-          </a:p>
-          <a:p>
-            <a:pPr lvl="1"/>
-            <a:r>
-              <a:rPr lang="en-SG" dirty="0" smtClean="0"/>
-              <a:t>Track Randomizer</a:t>
-            </a:r>
-          </a:p>
-        </p:txBody>
-      </p:sp>
-    </p:spTree>
-    <p:extLst>
-      <p:ext uri="{BB962C8B-B14F-4D97-AF65-F5344CB8AC3E}">
-        <p14:creationId xmlns:p14="http://schemas.microsoft.com/office/powerpoint/2010/main" val="1169537456"/>
-      </p:ext>
-    </p:extLst>
-  </p:cSld>
-  <p:clrMapOvr>
-    <a:masterClrMapping/>
-  </p:clrMapOvr>
+  <p:timing>
+    <p:tnLst>
+      <p:par>
+        <p:cTn id="1" dur="indefinite" restart="never" nodeType="tmRoot"/>
+      </p:par>
+    </p:tnLst>
+  </p:timing>
 </p:sld>
 </file>
 
@@ -7263,7 +7416,7 @@
   <a:extraClrSchemeLst/>
   <a:extLst>
     <a:ext uri="{05A4C25C-085E-4340-85A3-A5531E510DB2}">
-      <thm15:themeFamily xmlns="" xmlns:thm15="http://schemas.microsoft.com/office/thememl/2012/main" name="Organic" id="{28CDC826-8792-45C0-861B-85EB3ADEDA33}" vid="{7DAC20F1-423D-49E2-BD0B-50532748BAD0}"/>
+      <thm15:themeFamily xmlns:thm15="http://schemas.microsoft.com/office/thememl/2012/main" name="Organic" id="{28CDC826-8792-45C0-861B-85EB3ADEDA33}" vid="{7DAC20F1-423D-49E2-BD0B-50532748BAD0}"/>
     </a:ext>
   </a:extLst>
 </a:theme>

</xml_diff>